<commit_message>
Added formatting and tests
</commit_message>
<xml_diff>
--- a/tests/fixtures/markup-presentation.pptx
+++ b/tests/fixtures/markup-presentation.pptx
@@ -329,7 +329,7 @@
           <a:p>
             <a:fld id="{9AB3A824-1A51-4B26-AD58-A6D8E14F6C04}" type="datetimeFigureOut">
               <a:rPr lang="en-US" dirty="0"/>
-              <a:t>12/1/20</a:t>
+              <a:t>12/2/20</a:t>
             </a:fld>
             <a:endParaRPr lang="en-US" dirty="0"/>
           </a:p>
@@ -663,7 +663,7 @@
           <a:p>
             <a:fld id="{D857E33E-8B18-4087-B112-809917729534}" type="datetimeFigureOut">
               <a:rPr lang="en-US" dirty="0"/>
-              <a:t>12/1/20</a:t>
+              <a:t>12/2/20</a:t>
             </a:fld>
             <a:endParaRPr lang="en-US" dirty="0"/>
           </a:p>
@@ -965,7 +965,7 @@
           <a:p>
             <a:fld id="{D3FFE419-2371-464F-8239-3959401C3561}" type="datetimeFigureOut">
               <a:rPr lang="en-US" dirty="0"/>
-              <a:t>12/1/20</a:t>
+              <a:t>12/2/20</a:t>
             </a:fld>
             <a:endParaRPr lang="en-US" dirty="0"/>
           </a:p>
@@ -1212,7 +1212,7 @@
           <a:p>
             <a:fld id="{97D162C4-EDD9-4389-A98B-B87ECEA2A816}" type="datetimeFigureOut">
               <a:rPr lang="en-US" dirty="0"/>
-              <a:t>12/1/20</a:t>
+              <a:t>12/2/20</a:t>
             </a:fld>
             <a:endParaRPr lang="en-US" dirty="0"/>
           </a:p>
@@ -1619,7 +1619,7 @@
           <a:p>
             <a:fld id="{3E5059C3-6A89-4494-99FF-5A4D6FFD50EB}" type="datetimeFigureOut">
               <a:rPr lang="en-US" dirty="0"/>
-              <a:t>12/1/20</a:t>
+              <a:t>12/2/20</a:t>
             </a:fld>
             <a:endParaRPr lang="en-US" dirty="0"/>
           </a:p>
@@ -1933,7 +1933,7 @@
           <a:p>
             <a:fld id="{CA954B2F-12DE-47F5-8894-472B206D2E1E}" type="datetimeFigureOut">
               <a:rPr lang="en-US" dirty="0"/>
-              <a:t>12/1/20</a:t>
+              <a:t>12/2/20</a:t>
             </a:fld>
             <a:endParaRPr lang="en-US" dirty="0"/>
           </a:p>
@@ -2477,7 +2477,7 @@
           <a:p>
             <a:fld id="{3F30E46F-7819-4ACF-B48B-48222C2ACC88}" type="datetimeFigureOut">
               <a:rPr lang="en-US" dirty="0"/>
-              <a:t>12/1/20</a:t>
+              <a:t>12/2/20</a:t>
             </a:fld>
             <a:endParaRPr lang="en-US" dirty="0"/>
           </a:p>
@@ -2672,7 +2672,7 @@
           <a:p>
             <a:fld id="{1FAF3416-4057-4DAA-829D-4CA07428D088}" type="datetimeFigureOut">
               <a:rPr lang="en-US" dirty="0"/>
-              <a:t>12/1/20</a:t>
+              <a:t>12/2/20</a:t>
             </a:fld>
             <a:endParaRPr lang="en-US" dirty="0"/>
           </a:p>
@@ -2885,7 +2885,7 @@
           <a:p>
             <a:fld id="{921D9284-D300-4297-87F7-E791DCC15DB1}" type="datetimeFigureOut">
               <a:rPr lang="en-US" dirty="0"/>
-              <a:t>12/1/20</a:t>
+              <a:t>12/2/20</a:t>
             </a:fld>
             <a:endParaRPr lang="en-US" dirty="0"/>
           </a:p>
@@ -3254,7 +3254,7 @@
           <a:p>
             <a:fld id="{37D525BB-DA17-4BA0-B3C8-3AC3ABC827E6}" type="datetimeFigureOut">
               <a:rPr lang="en-US" dirty="0"/>
-              <a:t>12/1/20</a:t>
+              <a:t>12/2/20</a:t>
             </a:fld>
             <a:endParaRPr lang="en-US" dirty="0"/>
           </a:p>
@@ -3657,7 +3657,7 @@
           <a:p>
             <a:fld id="{B16C4C9A-3960-41CF-A4E9-2A8FB932454B}" type="datetimeFigureOut">
               <a:rPr lang="en-US" dirty="0"/>
-              <a:t>12/1/20</a:t>
+              <a:t>12/2/20</a:t>
             </a:fld>
             <a:endParaRPr lang="en-US" dirty="0"/>
           </a:p>
@@ -3968,7 +3968,7 @@
           <a:p>
             <a:fld id="{3CBC1C18-307B-4F68-A007-B5B542270E8D}" type="datetimeFigureOut">
               <a:rPr lang="en-US" dirty="0"/>
-              <a:t>12/1/20</a:t>
+              <a:t>12/2/20</a:t>
             </a:fld>
             <a:endParaRPr lang="en-US" dirty="0"/>
           </a:p>
@@ -4534,7 +4534,25 @@
                 </a:solidFill>
                 <a:latin typeface="Algerian" pitchFamily="82" charset="77"/>
               </a:rPr>
-              <a:t>slide </a:t>
+              <a:t>sli</a:t>
+            </a:r>
+            <a:r>
+              <a:rPr lang="en-NL" i="1" dirty="0">
+                <a:solidFill>
+                  <a:schemeClr val="tx2"/>
+                </a:solidFill>
+                <a:latin typeface="Algerian" pitchFamily="82" charset="77"/>
+              </a:rPr>
+              <a:t>d</a:t>
+            </a:r>
+            <a:r>
+              <a:rPr lang="en-NL" dirty="0">
+                <a:solidFill>
+                  <a:srgbClr val="FF0000"/>
+                </a:solidFill>
+                <a:latin typeface="Algerian" pitchFamily="82" charset="77"/>
+              </a:rPr>
+              <a:t>e </a:t>
             </a:r>
             <a:r>
               <a:rPr lang="en-NL" i="1" dirty="0">

</xml_diff>